<commit_message>
Updated presentation with images and links
Updated presentation with images and links
</commit_message>
<xml_diff>
--- a/July2017/API Management.pptx
+++ b/July2017/API Management.pptx
@@ -5,7 +5,7 @@
     <p:sldMasterId id="2147483660" r:id="rId1"/>
   </p:sldMasterIdLst>
   <p:notesMasterIdLst>
-    <p:notesMasterId r:id="rId38"/>
+    <p:notesMasterId r:id="rId40"/>
   </p:notesMasterIdLst>
   <p:sldIdLst>
     <p:sldId id="256" r:id="rId2"/>
@@ -44,6 +44,8 @@
     <p:sldId id="289" r:id="rId35"/>
     <p:sldId id="290" r:id="rId36"/>
     <p:sldId id="291" r:id="rId37"/>
+    <p:sldId id="292" r:id="rId38"/>
+    <p:sldId id="293" r:id="rId39"/>
   </p:sldIdLst>
   <p:sldSz cx="12192000" cy="6858000"/>
   <p:notesSz cx="6858000" cy="9144000"/>
@@ -319,7 +321,7 @@
               <a:pPr>
                 <a:defRPr/>
               </a:pPr>
-              <a:t>7/10/2017</a:t>
+              <a:t>7/12/2017</a:t>
             </a:fld>
             <a:endParaRPr lang="en-US"/>
           </a:p>
@@ -2733,6 +2735,290 @@
 </p:notes>
 </file>
 
+<file path=ppt/notesSlides/notesSlide8.xml><?xml version="1.0" encoding="utf-8"?>
+<p:notes xmlns:a="http://schemas.openxmlformats.org/drawingml/2006/main" xmlns:r="http://schemas.openxmlformats.org/officeDocument/2006/relationships" xmlns:p="http://schemas.openxmlformats.org/presentationml/2006/main">
+  <p:cSld>
+    <p:spTree>
+      <p:nvGrpSpPr>
+        <p:cNvPr id="1" name=""/>
+        <p:cNvGrpSpPr/>
+        <p:nvPr/>
+      </p:nvGrpSpPr>
+      <p:grpSpPr>
+        <a:xfrm>
+          <a:off x="0" y="0"/>
+          <a:ext cx="0" cy="0"/>
+          <a:chOff x="0" y="0"/>
+          <a:chExt cx="0" cy="0"/>
+        </a:xfrm>
+      </p:grpSpPr>
+      <p:sp>
+        <p:nvSpPr>
+          <p:cNvPr id="2" name="Slide Image Placeholder 1"/>
+          <p:cNvSpPr>
+            <a:spLocks noGrp="1" noRot="1" noChangeAspect="1"/>
+          </p:cNvSpPr>
+          <p:nvPr>
+            <p:ph type="sldImg"/>
+          </p:nvPr>
+        </p:nvSpPr>
+        <p:spPr/>
+      </p:sp>
+      <p:sp>
+        <p:nvSpPr>
+          <p:cNvPr id="3" name="Notes Placeholder 2"/>
+          <p:cNvSpPr>
+            <a:spLocks noGrp="1"/>
+          </p:cNvSpPr>
+          <p:nvPr>
+            <p:ph type="body" idx="1"/>
+          </p:nvPr>
+        </p:nvSpPr>
+        <p:spPr/>
+        <p:txBody>
+          <a:bodyPr/>
+          <a:lstStyle/>
+          <a:p>
+            <a:r>
+              <a:rPr lang="en-US" dirty="0"/>
+              <a:t>I’ve touched upon, via the Demo Customer API application, the following patterns:</a:t>
+            </a:r>
+          </a:p>
+          <a:p>
+            <a:endParaRPr lang="en-US" dirty="0"/>
+          </a:p>
+          <a:p>
+            <a:endParaRPr lang="en-US" dirty="0"/>
+          </a:p>
+          <a:p>
+            <a:r>
+              <a:rPr lang="en-US" dirty="0"/>
+              <a:t>Application/Connection settings within the PaaS API App is a great way to abstract and secure key / value pairs; however, a better way is to use an:</a:t>
+            </a:r>
+          </a:p>
+          <a:p>
+            <a:endParaRPr lang="en-US" dirty="0"/>
+          </a:p>
+          <a:p>
+            <a:r>
+              <a:rPr lang="en-US" dirty="0"/>
+              <a:t>External configuration - https://docs.microsoft.com/en-us/azure/architecture/patterns/external-configuration-store</a:t>
+            </a:r>
+          </a:p>
+          <a:p>
+            <a:endParaRPr lang="en-US" dirty="0"/>
+          </a:p>
+          <a:p>
+            <a:pPr marL="171450" indent="-171450">
+              <a:buFont typeface="Arial" panose="020B0604020202020204" pitchFamily="34" charset="0"/>
+              <a:buChar char="•"/>
+            </a:pPr>
+            <a:r>
+              <a:rPr lang="en-US" dirty="0"/>
+              <a:t>Using the “External configuration” pattern, it will avoid the “restart” usually associated when changing application / connection strings values</a:t>
+            </a:r>
+          </a:p>
+          <a:p>
+            <a:pPr marL="171450" indent="-171450">
+              <a:buFont typeface="Arial" panose="020B0604020202020204" pitchFamily="34" charset="0"/>
+              <a:buChar char="•"/>
+            </a:pPr>
+            <a:r>
+              <a:rPr lang="en-US" dirty="0"/>
+              <a:t>On the flip-side, a restart may be required due to the nature of the key / value pairs </a:t>
+            </a:r>
+            <a:r>
+              <a:rPr lang="en-US"/>
+              <a:t>being changed</a:t>
+            </a:r>
+            <a:endParaRPr lang="en-US" dirty="0"/>
+          </a:p>
+          <a:p>
+            <a:pPr marL="171450" indent="-171450">
+              <a:buFont typeface="Arial" panose="020B0604020202020204" pitchFamily="34" charset="0"/>
+              <a:buChar char="•"/>
+            </a:pPr>
+            <a:r>
+              <a:rPr lang="en-US" dirty="0"/>
+              <a:t>Implementation using Key-Vault - http://www.techxperiments.com/2017/01/21/cloud-design-patterns-external-configuration-store-pattern-using-azure-key-vault/</a:t>
+            </a:r>
+          </a:p>
+          <a:p>
+            <a:pPr marL="171450" indent="-171450">
+              <a:buFont typeface="Arial" panose="020B0604020202020204" pitchFamily="34" charset="0"/>
+              <a:buChar char="•"/>
+            </a:pPr>
+            <a:endParaRPr lang="en-US" dirty="0"/>
+          </a:p>
+          <a:p>
+            <a:pPr marL="171450" indent="-171450">
+              <a:buFont typeface="Arial" panose="020B0604020202020204" pitchFamily="34" charset="0"/>
+              <a:buChar char="•"/>
+            </a:pPr>
+            <a:endParaRPr lang="en-US" dirty="0"/>
+          </a:p>
+          <a:p>
+            <a:pPr marL="0" indent="0">
+              <a:buFont typeface="Arial" panose="020B0604020202020204" pitchFamily="34" charset="0"/>
+              <a:buNone/>
+            </a:pPr>
+            <a:r>
+              <a:rPr lang="en-US" dirty="0"/>
+              <a:t>Cache-aside pattern - https://docs.microsoft.com/en-us/azure/architecture/patterns/cache-aside</a:t>
+            </a:r>
+          </a:p>
+          <a:p>
+            <a:pPr marL="0" indent="0">
+              <a:buFont typeface="Arial" panose="020B0604020202020204" pitchFamily="34" charset="0"/>
+              <a:buNone/>
+            </a:pPr>
+            <a:endParaRPr lang="en-US" dirty="0"/>
+          </a:p>
+          <a:p>
+            <a:pPr marL="171450" indent="-171450">
+              <a:buFont typeface="Arial" panose="020B0604020202020204" pitchFamily="34" charset="0"/>
+              <a:buChar char="•"/>
+            </a:pPr>
+            <a:r>
+              <a:rPr lang="en-US" dirty="0"/>
+              <a:t>I manually invoke the cache via an API call, but the application can be easily changed to interrogate the cache and “prime the pump” when / if needed.</a:t>
+            </a:r>
+          </a:p>
+          <a:p>
+            <a:pPr marL="171450" indent="-171450">
+              <a:buFont typeface="Arial" panose="020B0604020202020204" pitchFamily="34" charset="0"/>
+              <a:buChar char="•"/>
+            </a:pPr>
+            <a:endParaRPr lang="en-US" dirty="0"/>
+          </a:p>
+          <a:p>
+            <a:pPr marL="171450" indent="-171450">
+              <a:buFont typeface="Arial" panose="020B0604020202020204" pitchFamily="34" charset="0"/>
+              <a:buChar char="•"/>
+            </a:pPr>
+            <a:endParaRPr lang="en-US" dirty="0"/>
+          </a:p>
+          <a:p>
+            <a:pPr marL="0" indent="0">
+              <a:buFont typeface="Arial" panose="020B0604020202020204" pitchFamily="34" charset="0"/>
+              <a:buNone/>
+            </a:pPr>
+            <a:r>
+              <a:rPr lang="en-US" dirty="0"/>
+              <a:t>Strangler / Anti-Corruption Pattern (i.e. abstraction)</a:t>
+            </a:r>
+          </a:p>
+          <a:p>
+            <a:pPr marL="0" indent="0">
+              <a:buFont typeface="Arial" panose="020B0604020202020204" pitchFamily="34" charset="0"/>
+              <a:buNone/>
+            </a:pPr>
+            <a:endParaRPr lang="en-US" dirty="0"/>
+          </a:p>
+          <a:p>
+            <a:pPr marL="171450" indent="-171450">
+              <a:buFont typeface="Arial" panose="020B0604020202020204" pitchFamily="34" charset="0"/>
+              <a:buChar char="•"/>
+            </a:pPr>
+            <a:r>
+              <a:rPr lang="en-US" dirty="0"/>
+              <a:t>https://docs.microsoft.com/en-us/azure/architecture/patterns/strangler</a:t>
+            </a:r>
+          </a:p>
+          <a:p>
+            <a:pPr marL="171450" indent="-171450">
+              <a:buFont typeface="Arial" panose="020B0604020202020204" pitchFamily="34" charset="0"/>
+              <a:buChar char="•"/>
+            </a:pPr>
+            <a:r>
+              <a:rPr lang="en-US" dirty="0"/>
+              <a:t>https://docs.microsoft.com/en-us/azure/architecture/patterns/anti-corruption-layer</a:t>
+            </a:r>
+          </a:p>
+          <a:p>
+            <a:pPr marL="171450" indent="-171450">
+              <a:buFont typeface="Arial" panose="020B0604020202020204" pitchFamily="34" charset="0"/>
+              <a:buChar char="•"/>
+            </a:pPr>
+            <a:endParaRPr lang="en-US" dirty="0"/>
+          </a:p>
+          <a:p>
+            <a:pPr marL="0" indent="0">
+              <a:buFont typeface="Arial" panose="020B0604020202020204" pitchFamily="34" charset="0"/>
+              <a:buNone/>
+            </a:pPr>
+            <a:r>
+              <a:rPr lang="en-US" dirty="0"/>
+              <a:t>	API Management abstracts consumers from the actual implementation. Think benefits of an ESB.</a:t>
+            </a:r>
+          </a:p>
+          <a:p>
+            <a:pPr marL="0" indent="0">
+              <a:buFont typeface="Arial" panose="020B0604020202020204" pitchFamily="34" charset="0"/>
+              <a:buNone/>
+            </a:pPr>
+            <a:endParaRPr lang="en-US" dirty="0"/>
+          </a:p>
+          <a:p>
+            <a:endParaRPr lang="en-US" dirty="0"/>
+          </a:p>
+          <a:p>
+            <a:r>
+              <a:rPr lang="en-US" dirty="0"/>
+              <a:t>Good patterns to implement when designing PaaS applications in the cloud:</a:t>
+            </a:r>
+          </a:p>
+          <a:p>
+            <a:endParaRPr lang="en-US" dirty="0"/>
+          </a:p>
+          <a:p>
+            <a:r>
+              <a:rPr lang="en-US" dirty="0"/>
+              <a:t>Retry pattern (Handling Transient Faults) - https://docs.microsoft.com/en-us/azure/architecture/patterns/retry</a:t>
+            </a:r>
+          </a:p>
+          <a:p>
+            <a:endParaRPr lang="en-US" dirty="0"/>
+          </a:p>
+        </p:txBody>
+      </p:sp>
+      <p:sp>
+        <p:nvSpPr>
+          <p:cNvPr id="4" name="Slide Number Placeholder 3"/>
+          <p:cNvSpPr>
+            <a:spLocks noGrp="1"/>
+          </p:cNvSpPr>
+          <p:nvPr>
+            <p:ph type="sldNum" sz="quarter" idx="10"/>
+          </p:nvPr>
+        </p:nvSpPr>
+        <p:spPr/>
+        <p:txBody>
+          <a:bodyPr/>
+          <a:lstStyle/>
+          <a:p>
+            <a:fld id="{FA653C62-766F-49E3-952C-6CD6B932AAF8}" type="slidenum">
+              <a:rPr lang="en-US" altLang="en-US" smtClean="0"/>
+              <a:pPr/>
+              <a:t>38</a:t>
+            </a:fld>
+            <a:endParaRPr lang="en-US" altLang="en-US"/>
+          </a:p>
+        </p:txBody>
+      </p:sp>
+    </p:spTree>
+    <p:extLst>
+      <p:ext uri="{BB962C8B-B14F-4D97-AF65-F5344CB8AC3E}">
+        <p14:creationId xmlns:p14="http://schemas.microsoft.com/office/powerpoint/2010/main" val="4242359555"/>
+      </p:ext>
+    </p:extLst>
+  </p:cSld>
+  <p:clrMapOvr>
+    <a:masterClrMapping/>
+  </p:clrMapOvr>
+</p:notes>
+</file>
+
 <file path=ppt/slideLayouts/slideLayout1.xml><?xml version="1.0" encoding="utf-8"?>
 <p:sldLayout xmlns:a="http://schemas.openxmlformats.org/drawingml/2006/main" xmlns:r="http://schemas.openxmlformats.org/officeDocument/2006/relationships" xmlns:p="http://schemas.openxmlformats.org/presentationml/2006/main" showMasterSp="0" type="title" preserve="1">
   <p:cSld name="Title Slide">
@@ -6883,7 +7169,7 @@
               <a:pPr>
                 <a:defRPr/>
               </a:pPr>
-              <a:t>7/10/2017</a:t>
+              <a:t>7/12/2017</a:t>
             </a:fld>
             <a:endParaRPr lang="en-US"/>
           </a:p>
@@ -7184,7 +7470,7 @@
               <a:pPr>
                 <a:defRPr/>
               </a:pPr>
-              <a:t>7/10/2017</a:t>
+              <a:t>7/12/2017</a:t>
             </a:fld>
             <a:endParaRPr lang="en-US"/>
           </a:p>
@@ -7416,7 +7702,7 @@
               <a:pPr>
                 <a:defRPr/>
               </a:pPr>
-              <a:t>7/10/2017</a:t>
+              <a:t>7/12/2017</a:t>
             </a:fld>
             <a:endParaRPr lang="en-US"/>
           </a:p>
@@ -7963,7 +8249,7 @@
               <a:pPr>
                 <a:defRPr/>
               </a:pPr>
-              <a:t>7/10/2017</a:t>
+              <a:t>7/12/2017</a:t>
             </a:fld>
             <a:endParaRPr lang="en-US"/>
           </a:p>
@@ -8195,7 +8481,7 @@
               <a:pPr>
                 <a:defRPr/>
               </a:pPr>
-              <a:t>7/10/2017</a:t>
+              <a:t>7/12/2017</a:t>
             </a:fld>
             <a:endParaRPr lang="en-US"/>
           </a:p>
@@ -8775,7 +9061,7 @@
               <a:pPr>
                 <a:defRPr/>
               </a:pPr>
-              <a:t>7/10/2017</a:t>
+              <a:t>7/12/2017</a:t>
             </a:fld>
             <a:endParaRPr lang="en-US"/>
           </a:p>
@@ -9523,7 +9809,7 @@
               <a:pPr>
                 <a:defRPr/>
               </a:pPr>
-              <a:t>7/10/2017</a:t>
+              <a:t>7/12/2017</a:t>
             </a:fld>
             <a:endParaRPr lang="en-US"/>
           </a:p>
@@ -9733,7 +10019,7 @@
               <a:pPr>
                 <a:defRPr/>
               </a:pPr>
-              <a:t>7/10/2017</a:t>
+              <a:t>7/12/2017</a:t>
             </a:fld>
             <a:endParaRPr lang="en-US"/>
           </a:p>
@@ -9953,7 +10239,7 @@
               <a:pPr>
                 <a:defRPr/>
               </a:pPr>
-              <a:t>7/10/2017</a:t>
+              <a:t>7/12/2017</a:t>
             </a:fld>
             <a:endParaRPr lang="en-US"/>
           </a:p>
@@ -10163,7 +10449,7 @@
               <a:pPr>
                 <a:defRPr/>
               </a:pPr>
-              <a:t>7/10/2017</a:t>
+              <a:t>7/12/2017</a:t>
             </a:fld>
             <a:endParaRPr lang="en-US"/>
           </a:p>
@@ -10449,7 +10735,7 @@
               <a:pPr>
                 <a:defRPr/>
               </a:pPr>
-              <a:t>7/10/2017</a:t>
+              <a:t>7/12/2017</a:t>
             </a:fld>
             <a:endParaRPr lang="en-US"/>
           </a:p>
@@ -10721,7 +11007,7 @@
               <a:pPr>
                 <a:defRPr/>
               </a:pPr>
-              <a:t>7/10/2017</a:t>
+              <a:t>7/12/2017</a:t>
             </a:fld>
             <a:endParaRPr lang="en-US"/>
           </a:p>
@@ -11142,7 +11428,7 @@
               <a:pPr>
                 <a:defRPr/>
               </a:pPr>
-              <a:t>7/10/2017</a:t>
+              <a:t>7/12/2017</a:t>
             </a:fld>
             <a:endParaRPr lang="en-US"/>
           </a:p>
@@ -11300,7 +11586,7 @@
               <a:pPr>
                 <a:defRPr/>
               </a:pPr>
-              <a:t>7/10/2017</a:t>
+              <a:t>7/12/2017</a:t>
             </a:fld>
             <a:endParaRPr lang="en-US"/>
           </a:p>
@@ -11435,7 +11721,7 @@
               <a:pPr>
                 <a:defRPr/>
               </a:pPr>
-              <a:t>7/10/2017</a:t>
+              <a:t>7/12/2017</a:t>
             </a:fld>
             <a:endParaRPr lang="en-US"/>
           </a:p>
@@ -11724,7 +12010,7 @@
               <a:pPr>
                 <a:defRPr/>
               </a:pPr>
-              <a:t>7/10/2017</a:t>
+              <a:t>7/12/2017</a:t>
             </a:fld>
             <a:endParaRPr lang="en-US"/>
           </a:p>
@@ -12047,7 +12333,7 @@
               <a:pPr>
                 <a:defRPr/>
               </a:pPr>
-              <a:t>7/10/2017</a:t>
+              <a:t>7/12/2017</a:t>
             </a:fld>
             <a:endParaRPr lang="en-US"/>
           </a:p>
@@ -15147,7 +15433,7 @@
               <a:pPr>
                 <a:defRPr/>
               </a:pPr>
-              <a:t>7/10/2017</a:t>
+              <a:t>7/12/2017</a:t>
             </a:fld>
             <a:endParaRPr lang="en-US"/>
           </a:p>
@@ -19364,6 +19650,236 @@
     <p:extLst>
       <p:ext uri="{BB962C8B-B14F-4D97-AF65-F5344CB8AC3E}">
         <p14:creationId xmlns:p14="http://schemas.microsoft.com/office/powerpoint/2010/main" val="2486618509"/>
+      </p:ext>
+    </p:extLst>
+  </p:cSld>
+  <p:clrMapOvr>
+    <a:masterClrMapping/>
+  </p:clrMapOvr>
+</p:sld>
+</file>
+
+<file path=ppt/slides/slide37.xml><?xml version="1.0" encoding="utf-8"?>
+<p:sld xmlns:a="http://schemas.openxmlformats.org/drawingml/2006/main" xmlns:r="http://schemas.openxmlformats.org/officeDocument/2006/relationships" xmlns:p="http://schemas.openxmlformats.org/presentationml/2006/main">
+  <p:cSld>
+    <p:spTree>
+      <p:nvGrpSpPr>
+        <p:cNvPr id="1" name=""/>
+        <p:cNvGrpSpPr/>
+        <p:nvPr/>
+      </p:nvGrpSpPr>
+      <p:grpSpPr>
+        <a:xfrm>
+          <a:off x="0" y="0"/>
+          <a:ext cx="0" cy="0"/>
+          <a:chOff x="0" y="0"/>
+          <a:chExt cx="0" cy="0"/>
+        </a:xfrm>
+      </p:grpSpPr>
+      <p:sp>
+        <p:nvSpPr>
+          <p:cNvPr id="2" name="Title 1">
+            <a:extLst>
+              <a:ext uri="{FF2B5EF4-FFF2-40B4-BE49-F238E27FC236}">
+                <a16:creationId xmlns:a16="http://schemas.microsoft.com/office/drawing/2014/main" id="{38349139-CEB8-4449-BA0B-04976F7D8BDE}"/>
+              </a:ext>
+            </a:extLst>
+          </p:cNvPr>
+          <p:cNvSpPr>
+            <a:spLocks noGrp="1"/>
+          </p:cNvSpPr>
+          <p:nvPr>
+            <p:ph type="title"/>
+          </p:nvPr>
+        </p:nvSpPr>
+        <p:spPr>
+          <a:xfrm>
+            <a:off x="1141413" y="-10160"/>
+            <a:ext cx="9906000" cy="1477963"/>
+          </a:xfrm>
+        </p:spPr>
+        <p:txBody>
+          <a:bodyPr/>
+          <a:lstStyle/>
+          <a:p>
+            <a:r>
+              <a:rPr lang="en-US" dirty="0">
+                <a:solidFill>
+                  <a:schemeClr val="bg2">
+                    <a:lumMod val="75000"/>
+                  </a:schemeClr>
+                </a:solidFill>
+              </a:rPr>
+              <a:t>AZURE portal Analytics</a:t>
+            </a:r>
+          </a:p>
+        </p:txBody>
+      </p:sp>
+      <p:pic>
+        <p:nvPicPr>
+          <p:cNvPr id="7" name="Content Placeholder 6">
+            <a:extLst>
+              <a:ext uri="{FF2B5EF4-FFF2-40B4-BE49-F238E27FC236}">
+                <a16:creationId xmlns:a16="http://schemas.microsoft.com/office/drawing/2014/main" id="{3A10C33E-830F-4644-840C-A47B59DD4EAC}"/>
+              </a:ext>
+            </a:extLst>
+          </p:cNvPr>
+          <p:cNvPicPr>
+            <a:picLocks noGrp="1" noChangeAspect="1"/>
+          </p:cNvPicPr>
+          <p:nvPr>
+            <p:ph idx="1"/>
+          </p:nvPr>
+        </p:nvPicPr>
+        <p:blipFill>
+          <a:blip r:embed="rId2"/>
+          <a:stretch>
+            <a:fillRect/>
+          </a:stretch>
+        </p:blipFill>
+        <p:spPr>
+          <a:xfrm>
+            <a:off x="1371600" y="990600"/>
+            <a:ext cx="9566030" cy="5181600"/>
+          </a:xfrm>
+          <a:prstGeom prst="rect">
+            <a:avLst/>
+          </a:prstGeom>
+        </p:spPr>
+      </p:pic>
+    </p:spTree>
+    <p:extLst>
+      <p:ext uri="{BB962C8B-B14F-4D97-AF65-F5344CB8AC3E}">
+        <p14:creationId xmlns:p14="http://schemas.microsoft.com/office/powerpoint/2010/main" val="3066503705"/>
+      </p:ext>
+    </p:extLst>
+  </p:cSld>
+  <p:clrMapOvr>
+    <a:masterClrMapping/>
+  </p:clrMapOvr>
+</p:sld>
+</file>
+
+<file path=ppt/slides/slide38.xml><?xml version="1.0" encoding="utf-8"?>
+<p:sld xmlns:a="http://schemas.openxmlformats.org/drawingml/2006/main" xmlns:r="http://schemas.openxmlformats.org/officeDocument/2006/relationships" xmlns:p="http://schemas.openxmlformats.org/presentationml/2006/main">
+  <p:cSld>
+    <p:spTree>
+      <p:nvGrpSpPr>
+        <p:cNvPr id="1" name=""/>
+        <p:cNvGrpSpPr/>
+        <p:nvPr/>
+      </p:nvGrpSpPr>
+      <p:grpSpPr>
+        <a:xfrm>
+          <a:off x="0" y="0"/>
+          <a:ext cx="0" cy="0"/>
+          <a:chOff x="0" y="0"/>
+          <a:chExt cx="0" cy="0"/>
+        </a:xfrm>
+      </p:grpSpPr>
+      <p:sp>
+        <p:nvSpPr>
+          <p:cNvPr id="2" name="Title 1">
+            <a:extLst>
+              <a:ext uri="{FF2B5EF4-FFF2-40B4-BE49-F238E27FC236}">
+                <a16:creationId xmlns:a16="http://schemas.microsoft.com/office/drawing/2014/main" id="{1438D9D5-9166-4068-9350-E481EABE5849}"/>
+              </a:ext>
+            </a:extLst>
+          </p:cNvPr>
+          <p:cNvSpPr>
+            <a:spLocks noGrp="1"/>
+          </p:cNvSpPr>
+          <p:nvPr>
+            <p:ph type="title"/>
+          </p:nvPr>
+        </p:nvSpPr>
+        <p:spPr/>
+        <p:txBody>
+          <a:bodyPr/>
+          <a:lstStyle/>
+          <a:p>
+            <a:r>
+              <a:rPr lang="en-US" dirty="0">
+                <a:solidFill>
+                  <a:schemeClr val="bg2">
+                    <a:lumMod val="75000"/>
+                  </a:schemeClr>
+                </a:solidFill>
+              </a:rPr>
+              <a:t>Helpful resources</a:t>
+            </a:r>
+          </a:p>
+        </p:txBody>
+      </p:sp>
+      <p:sp>
+        <p:nvSpPr>
+          <p:cNvPr id="3" name="Content Placeholder 2">
+            <a:extLst>
+              <a:ext uri="{FF2B5EF4-FFF2-40B4-BE49-F238E27FC236}">
+                <a16:creationId xmlns:a16="http://schemas.microsoft.com/office/drawing/2014/main" id="{0B1BA735-D62E-438D-8C04-23B01A8701AC}"/>
+              </a:ext>
+            </a:extLst>
+          </p:cNvPr>
+          <p:cNvSpPr>
+            <a:spLocks noGrp="1"/>
+          </p:cNvSpPr>
+          <p:nvPr>
+            <p:ph idx="1"/>
+          </p:nvPr>
+        </p:nvSpPr>
+        <p:spPr/>
+        <p:txBody>
+          <a:bodyPr/>
+          <a:lstStyle/>
+          <a:p>
+            <a:r>
+              <a:rPr lang="en-US" dirty="0">
+                <a:solidFill>
+                  <a:schemeClr val="bg2">
+                    <a:lumMod val="75000"/>
+                  </a:schemeClr>
+                </a:solidFill>
+              </a:rPr>
+              <a:t>Cloud design patterns - https://docs.microsoft.com/en-us/azure/architecture/patterns/</a:t>
+            </a:r>
+          </a:p>
+          <a:p>
+            <a:r>
+              <a:rPr lang="en-US" dirty="0" err="1">
+                <a:solidFill>
+                  <a:schemeClr val="bg2">
+                    <a:lumMod val="75000"/>
+                  </a:schemeClr>
+                </a:solidFill>
+              </a:rPr>
+              <a:t>Plurasight’s</a:t>
+            </a:r>
+            <a:r>
+              <a:rPr lang="en-US" dirty="0">
+                <a:solidFill>
+                  <a:schemeClr val="bg2">
+                    <a:lumMod val="75000"/>
+                  </a:schemeClr>
+                </a:solidFill>
+              </a:rPr>
+              <a:t> Azure API Management course - https://www.pluralsight.com/courses/microsoft-azure-api-management-essentials</a:t>
+            </a:r>
+          </a:p>
+          <a:p>
+            <a:endParaRPr lang="en-US" dirty="0">
+              <a:solidFill>
+                <a:schemeClr val="bg2">
+                  <a:lumMod val="75000"/>
+                </a:schemeClr>
+              </a:solidFill>
+            </a:endParaRPr>
+          </a:p>
+        </p:txBody>
+      </p:sp>
+    </p:spTree>
+    <p:extLst>
+      <p:ext uri="{BB962C8B-B14F-4D97-AF65-F5344CB8AC3E}">
+        <p14:creationId xmlns:p14="http://schemas.microsoft.com/office/powerpoint/2010/main" val="976897739"/>
       </p:ext>
     </p:extLst>
   </p:cSld>

</xml_diff>